<commit_message>
Reduced the amount of requested clusters to speed up queueing.
</commit_message>
<xml_diff>
--- a/workflow/notebooks/Overview-Analysis.pptx
+++ b/workflow/notebooks/Overview-Analysis.pptx
@@ -21,6 +21,7 @@
     <p:sldId id="269" r:id="rId15"/>
     <p:sldId id="270" r:id="rId16"/>
     <p:sldId id="271" r:id="rId17"/>
+    <p:sldId id="272" r:id="rId18"/>
   </p:sldIdLst>
   <p:sldSz cx="9144000" cy="6858000" type="screen4x3"/>
   <p:notesSz cx="6858000" cy="9144000"/>
@@ -3259,6 +3260,61 @@
           <a:chExt cx="0" cy="0"/>
         </a:xfrm>
       </p:grpSpPr>
+      <p:sp>
+        <p:nvSpPr>
+          <p:cNvPr id="3" name="Content Placeholder 2"/>
+          <p:cNvSpPr>
+            <a:spLocks noGrp="1"/>
+          </p:cNvSpPr>
+          <p:nvPr>
+            <p:ph idx="1"/>
+          </p:nvPr>
+        </p:nvSpPr>
+        <p:spPr/>
+        <p:txBody>
+          <a:bodyPr/>
+          <a:lstStyle/>
+          <a:p>
+            <a:pPr lvl="0" marL="0" indent="0">
+              <a:buNone/>
+            </a:pPr>
+          </a:p>
+          <a:p>
+            <a:pPr lvl="0" marL="0" indent="0">
+              <a:spcBef>
+                <a:spcPts val="3000"/>
+              </a:spcBef>
+              <a:buNone/>
+            </a:pPr>
+            <a:r>
+              <a:rPr b="1"/>
+              <a:t>Variants over RBD (&gt;0.01)</a:t>
+            </a:r>
+          </a:p>
+        </p:txBody>
+      </p:sp>
+    </p:spTree>
+  </p:cSld>
+</p:sld>
+</file>
+
+<file path=ppt/slides/slide11.xml><?xml version="1.0" encoding="utf-8"?>
+<p:sld xmlns:a="http://schemas.openxmlformats.org/drawingml/2006/main" xmlns:r="http://schemas.openxmlformats.org/officeDocument/2006/relationships" xmlns:p="http://schemas.openxmlformats.org/presentationml/2006/main">
+  <p:cSld>
+    <p:spTree>
+      <p:nvGrpSpPr>
+        <p:cNvPr id="1" name=""/>
+        <p:cNvGrpSpPr/>
+        <p:nvPr/>
+      </p:nvGrpSpPr>
+      <p:grpSpPr>
+        <a:xfrm>
+          <a:off x="0" y="0"/>
+          <a:ext cx="0" cy="0"/>
+          <a:chOff x="0" y="0"/>
+          <a:chExt cx="0" cy="0"/>
+        </a:xfrm>
+      </p:grpSpPr>
       <p:pic>
         <p:nvPicPr>
           <p:cNvPr descr="Overview-Analysis_files/figure-pptx/Variants%20RBD-1.png" id="0" name="Picture 1"/>
@@ -3294,7 +3350,7 @@
 </p:sld>
 </file>
 
-<file path=ppt/slides/slide11.xml><?xml version="1.0" encoding="utf-8"?>
+<file path=ppt/slides/slide12.xml><?xml version="1.0" encoding="utf-8"?>
 <p:sld xmlns:a="http://schemas.openxmlformats.org/drawingml/2006/main" xmlns:r="http://schemas.openxmlformats.org/officeDocument/2006/relationships" xmlns:p="http://schemas.openxmlformats.org/presentationml/2006/main">
   <p:cSld>
     <p:spTree>
@@ -3349,7 +3405,7 @@
 </p:sld>
 </file>
 
-<file path=ppt/slides/slide12.xml><?xml version="1.0" encoding="utf-8"?>
+<file path=ppt/slides/slide13.xml><?xml version="1.0" encoding="utf-8"?>
 <p:sld xmlns:a="http://schemas.openxmlformats.org/drawingml/2006/main" xmlns:r="http://schemas.openxmlformats.org/officeDocument/2006/relationships" xmlns:p="http://schemas.openxmlformats.org/presentationml/2006/main">
   <p:cSld>
     <p:spTree>
@@ -3401,7 +3457,7 @@
 </p:sld>
 </file>
 
-<file path=ppt/slides/slide13.xml><?xml version="1.0" encoding="utf-8"?>
+<file path=ppt/slides/slide14.xml><?xml version="1.0" encoding="utf-8"?>
 <p:sld xmlns:a="http://schemas.openxmlformats.org/drawingml/2006/main" xmlns:r="http://schemas.openxmlformats.org/officeDocument/2006/relationships" xmlns:p="http://schemas.openxmlformats.org/presentationml/2006/main">
   <p:cSld>
     <p:spTree>
@@ -3456,7 +3512,7 @@
 </p:sld>
 </file>
 
-<file path=ppt/slides/slide14.xml><?xml version="1.0" encoding="utf-8"?>
+<file path=ppt/slides/slide15.xml><?xml version="1.0" encoding="utf-8"?>
 <p:sld xmlns:a="http://schemas.openxmlformats.org/drawingml/2006/main" xmlns:r="http://schemas.openxmlformats.org/officeDocument/2006/relationships" xmlns:p="http://schemas.openxmlformats.org/presentationml/2006/main">
   <p:cSld>
     <p:spTree>
@@ -3508,7 +3564,7 @@
 </p:sld>
 </file>
 
-<file path=ppt/slides/slide15.xml><?xml version="1.0" encoding="utf-8"?>
+<file path=ppt/slides/slide16.xml><?xml version="1.0" encoding="utf-8"?>
 <p:sld xmlns:a="http://schemas.openxmlformats.org/drawingml/2006/main" xmlns:r="http://schemas.openxmlformats.org/officeDocument/2006/relationships" xmlns:p="http://schemas.openxmlformats.org/presentationml/2006/main">
   <p:cSld>
     <p:spTree>
@@ -3563,7 +3619,7 @@
 </p:sld>
 </file>
 
-<file path=ppt/slides/slide16.xml><?xml version="1.0" encoding="utf-8"?>
+<file path=ppt/slides/slide17.xml><?xml version="1.0" encoding="utf-8"?>
 <p:sld xmlns:a="http://schemas.openxmlformats.org/drawingml/2006/main" xmlns:r="http://schemas.openxmlformats.org/officeDocument/2006/relationships" xmlns:p="http://schemas.openxmlformats.org/presentationml/2006/main">
   <p:cSld>
     <p:spTree>
@@ -3652,6 +3708,165 @@
             </a:pPr>
             <a:r>
               <a:rPr/>
+              <a:t>Summary</a:t>
+            </a:r>
+          </a:p>
+        </p:txBody>
+      </p:sp>
+      <p:sp>
+        <p:nvSpPr>
+          <p:cNvPr id="3" name="Content Placeholder 2"/>
+          <p:cNvSpPr>
+            <a:spLocks noGrp="1"/>
+          </p:cNvSpPr>
+          <p:nvPr>
+            <p:ph idx="1"/>
+          </p:nvPr>
+        </p:nvSpPr>
+        <p:spPr/>
+        <p:txBody>
+          <a:bodyPr/>
+          <a:lstStyle/>
+          <a:p>
+            <a:pPr lvl="0" marL="0" indent="0">
+              <a:buNone/>
+            </a:pPr>
+            <a:r>
+              <a:rPr/>
+              <a:t>This notebook contains the code for generating the main figures associated with the deep sequencing analysis of SARS-CoV-2 from an immunocompromised patient. The associated publication for these samples is located </a:t>
+            </a:r>
+            <a:r>
+              <a:rPr>
+                <a:hlinkClick r:id="rId2"/>
+              </a:rPr>
+              <a:t>here</a:t>
+            </a:r>
+            <a:r>
+              <a:rPr/>
+              <a:t>.</a:t>
+            </a:r>
+          </a:p>
+          <a:p>
+            <a:pPr lvl="0" marL="0" indent="0">
+              <a:buNone/>
+            </a:pPr>
+            <a:r>
+              <a:rPr/>
+              <a:t>Runs containing raw paired-end(</a:t>
+            </a:r>
+            <a:r>
+              <a:rPr b="1"/>
+              <a:t>?</a:t>
+            </a:r>
+            <a:r>
+              <a:rPr/>
+              <a:t>) reads (</a:t>
+            </a:r>
+            <a:r>
+              <a:rPr sz="1800">
+                <a:latin typeface="Courier"/>
+              </a:rPr>
+              <a:t>fastq</a:t>
+            </a:r>
+            <a:r>
+              <a:rPr/>
+              <a:t>) for each of nine timepoints since initial infection (days 18, 25, 75, 81, 128, 130, 143, 146, and 152) were filtered and trimmed using </a:t>
+            </a:r>
+            <a:r>
+              <a:rPr sz="1800">
+                <a:latin typeface="Courier"/>
+              </a:rPr>
+              <a:t>fastp</a:t>
+            </a:r>
+            <a:r>
+              <a:rPr/>
+              <a:t>. Reads matching SARS-CoV-2 sequences were filtered using kmer matching with </a:t>
+            </a:r>
+            <a:r>
+              <a:rPr sz="1800">
+                <a:latin typeface="Courier"/>
+              </a:rPr>
+              <a:t>BBDuk</a:t>
+            </a:r>
+            <a:r>
+              <a:rPr/>
+              <a:t>. These reads were aligned to the Wuhan-Hu-1 reference genome (NC_045512.2) with </a:t>
+            </a:r>
+            <a:r>
+              <a:rPr sz="1800">
+                <a:latin typeface="Courier"/>
+              </a:rPr>
+              <a:t>BWA.</a:t>
+            </a:r>
+            <a:r>
+              <a:rPr/>
+              <a:t> SNPs were identified in each sample with the variant caller </a:t>
+            </a:r>
+            <a:r>
+              <a:rPr sz="1800">
+                <a:latin typeface="Courier"/>
+              </a:rPr>
+              <a:t>lofreq</a:t>
+            </a:r>
+            <a:r>
+              <a:rPr/>
+              <a:t> and confirmed by parsing the read pileup statistics generated by </a:t>
+            </a:r>
+            <a:r>
+              <a:rPr sz="1800">
+                <a:latin typeface="Courier"/>
+              </a:rPr>
+              <a:t>samtools mpileup</a:t>
+            </a:r>
+            <a:r>
+              <a:rPr/>
+              <a:t>.</a:t>
+            </a:r>
+          </a:p>
+        </p:txBody>
+      </p:sp>
+    </p:spTree>
+  </p:cSld>
+</p:sld>
+</file>
+
+<file path=ppt/slides/slide3.xml><?xml version="1.0" encoding="utf-8"?>
+<p:sld xmlns:a="http://schemas.openxmlformats.org/drawingml/2006/main" xmlns:r="http://schemas.openxmlformats.org/officeDocument/2006/relationships" xmlns:p="http://schemas.openxmlformats.org/presentationml/2006/main">
+  <p:cSld>
+    <p:spTree>
+      <p:nvGrpSpPr>
+        <p:cNvPr id="1" name=""/>
+        <p:cNvGrpSpPr/>
+        <p:nvPr/>
+      </p:nvGrpSpPr>
+      <p:grpSpPr>
+        <a:xfrm>
+          <a:off x="0" y="0"/>
+          <a:ext cx="0" cy="0"/>
+          <a:chOff x="0" y="0"/>
+          <a:chExt cx="0" cy="0"/>
+        </a:xfrm>
+      </p:grpSpPr>
+      <p:sp>
+        <p:nvSpPr>
+          <p:cNvPr id="2" name="Title 1"/>
+          <p:cNvSpPr>
+            <a:spLocks noGrp="1"/>
+          </p:cNvSpPr>
+          <p:nvPr>
+            <p:ph type="title"/>
+          </p:nvPr>
+        </p:nvSpPr>
+        <p:spPr/>
+        <p:txBody>
+          <a:bodyPr/>
+          <a:lstStyle/>
+          <a:p>
+            <a:pPr lvl="0" marL="0" indent="0">
+              <a:buNone/>
+            </a:pPr>
+            <a:r>
+              <a:rPr/>
               <a:t>Coverage</a:t>
             </a:r>
             <a:r>
@@ -3708,7 +3923,7 @@
 </p:sld>
 </file>
 
-<file path=ppt/slides/slide3.xml><?xml version="1.0" encoding="utf-8"?>
+<file path=ppt/slides/slide4.xml><?xml version="1.0" encoding="utf-8"?>
 <p:sld xmlns:a="http://schemas.openxmlformats.org/drawingml/2006/main" xmlns:r="http://schemas.openxmlformats.org/officeDocument/2006/relationships" xmlns:p="http://schemas.openxmlformats.org/presentationml/2006/main">
   <p:cSld>
     <p:spTree>
@@ -3763,7 +3978,7 @@
 </p:sld>
 </file>
 
-<file path=ppt/slides/slide4.xml><?xml version="1.0" encoding="utf-8"?>
+<file path=ppt/slides/slide5.xml><?xml version="1.0" encoding="utf-8"?>
 <p:sld xmlns:a="http://schemas.openxmlformats.org/drawingml/2006/main" xmlns:r="http://schemas.openxmlformats.org/officeDocument/2006/relationships" xmlns:p="http://schemas.openxmlformats.org/presentationml/2006/main">
   <p:cSld>
     <p:spTree>
@@ -3815,7 +4030,7 @@
 </p:sld>
 </file>
 
-<file path=ppt/slides/slide5.xml><?xml version="1.0" encoding="utf-8"?>
+<file path=ppt/slides/slide6.xml><?xml version="1.0" encoding="utf-8"?>
 <p:sld xmlns:a="http://schemas.openxmlformats.org/drawingml/2006/main" xmlns:r="http://schemas.openxmlformats.org/officeDocument/2006/relationships" xmlns:p="http://schemas.openxmlformats.org/presentationml/2006/main">
   <p:cSld>
     <p:spTree>
@@ -3870,7 +4085,7 @@
 </p:sld>
 </file>
 
-<file path=ppt/slides/slide6.xml><?xml version="1.0" encoding="utf-8"?>
+<file path=ppt/slides/slide7.xml><?xml version="1.0" encoding="utf-8"?>
 <p:sld xmlns:a="http://schemas.openxmlformats.org/drawingml/2006/main" xmlns:r="http://schemas.openxmlformats.org/officeDocument/2006/relationships" xmlns:p="http://schemas.openxmlformats.org/presentationml/2006/main">
   <p:cSld>
     <p:spTree>
@@ -3922,7 +4137,7 @@
 </p:sld>
 </file>
 
-<file path=ppt/slides/slide7.xml><?xml version="1.0" encoding="utf-8"?>
+<file path=ppt/slides/slide8.xml><?xml version="1.0" encoding="utf-8"?>
 <p:sld xmlns:a="http://schemas.openxmlformats.org/drawingml/2006/main" xmlns:r="http://schemas.openxmlformats.org/officeDocument/2006/relationships" xmlns:p="http://schemas.openxmlformats.org/presentationml/2006/main">
   <p:cSld>
     <p:spTree>
@@ -3977,7 +4192,7 @@
 </p:sld>
 </file>
 
-<file path=ppt/slides/slide8.xml><?xml version="1.0" encoding="utf-8"?>
+<file path=ppt/slides/slide9.xml><?xml version="1.0" encoding="utf-8"?>
 <p:sld xmlns:a="http://schemas.openxmlformats.org/drawingml/2006/main" xmlns:r="http://schemas.openxmlformats.org/officeDocument/2006/relationships" xmlns:p="http://schemas.openxmlformats.org/presentationml/2006/main">
   <p:cSld>
     <p:spTree>
@@ -4024,61 +4239,6 @@
           </a:ln>
         </p:spPr>
       </p:pic>
-    </p:spTree>
-  </p:cSld>
-</p:sld>
-</file>
-
-<file path=ppt/slides/slide9.xml><?xml version="1.0" encoding="utf-8"?>
-<p:sld xmlns:a="http://schemas.openxmlformats.org/drawingml/2006/main" xmlns:r="http://schemas.openxmlformats.org/officeDocument/2006/relationships" xmlns:p="http://schemas.openxmlformats.org/presentationml/2006/main">
-  <p:cSld>
-    <p:spTree>
-      <p:nvGrpSpPr>
-        <p:cNvPr id="1" name=""/>
-        <p:cNvGrpSpPr/>
-        <p:nvPr/>
-      </p:nvGrpSpPr>
-      <p:grpSpPr>
-        <a:xfrm>
-          <a:off x="0" y="0"/>
-          <a:ext cx="0" cy="0"/>
-          <a:chOff x="0" y="0"/>
-          <a:chExt cx="0" cy="0"/>
-        </a:xfrm>
-      </p:grpSpPr>
-      <p:sp>
-        <p:nvSpPr>
-          <p:cNvPr id="3" name="Content Placeholder 2"/>
-          <p:cNvSpPr>
-            <a:spLocks noGrp="1"/>
-          </p:cNvSpPr>
-          <p:nvPr>
-            <p:ph idx="1"/>
-          </p:nvPr>
-        </p:nvSpPr>
-        <p:spPr/>
-        <p:txBody>
-          <a:bodyPr/>
-          <a:lstStyle/>
-          <a:p>
-            <a:pPr lvl="0" marL="0" indent="0">
-              <a:buNone/>
-            </a:pPr>
-          </a:p>
-          <a:p>
-            <a:pPr lvl="0" marL="0" indent="0">
-              <a:spcBef>
-                <a:spcPts val="3000"/>
-              </a:spcBef>
-              <a:buNone/>
-            </a:pPr>
-            <a:r>
-              <a:rPr b="1"/>
-              <a:t>Variants over RBD (&gt;0.01)</a:t>
-            </a:r>
-          </a:p>
-        </p:txBody>
-      </p:sp>
     </p:spTree>
   </p:cSld>
 </p:sld>

</xml_diff>